<commit_message>
Finish implementation chapter (woohoo!)
</commit_message>
<xml_diff>
--- a/proposal/proposal-project-structure-diagram.pptx
+++ b/proposal/proposal-project-structure-diagram.pptx
@@ -243,7 +243,7 @@
           <a:p>
             <a:fld id="{1C54AB3B-3A03-4B9C-A77D-B0E6FF1BCA80}" type="datetimeFigureOut">
               <a:rPr lang="en-GB" smtClean="0"/>
-              <a:t>02/03/2017</a:t>
+              <a:t>22/03/2017</a:t>
             </a:fld>
             <a:endParaRPr lang="en-GB" dirty="0"/>
           </a:p>
@@ -413,7 +413,7 @@
           <a:p>
             <a:fld id="{1C54AB3B-3A03-4B9C-A77D-B0E6FF1BCA80}" type="datetimeFigureOut">
               <a:rPr lang="en-GB" smtClean="0"/>
-              <a:t>02/03/2017</a:t>
+              <a:t>22/03/2017</a:t>
             </a:fld>
             <a:endParaRPr lang="en-GB" dirty="0"/>
           </a:p>
@@ -593,7 +593,7 @@
           <a:p>
             <a:fld id="{1C54AB3B-3A03-4B9C-A77D-B0E6FF1BCA80}" type="datetimeFigureOut">
               <a:rPr lang="en-GB" smtClean="0"/>
-              <a:t>02/03/2017</a:t>
+              <a:t>22/03/2017</a:t>
             </a:fld>
             <a:endParaRPr lang="en-GB" dirty="0"/>
           </a:p>
@@ -763,7 +763,7 @@
           <a:p>
             <a:fld id="{1C54AB3B-3A03-4B9C-A77D-B0E6FF1BCA80}" type="datetimeFigureOut">
               <a:rPr lang="en-GB" smtClean="0"/>
-              <a:t>02/03/2017</a:t>
+              <a:t>22/03/2017</a:t>
             </a:fld>
             <a:endParaRPr lang="en-GB" dirty="0"/>
           </a:p>
@@ -1009,7 +1009,7 @@
           <a:p>
             <a:fld id="{1C54AB3B-3A03-4B9C-A77D-B0E6FF1BCA80}" type="datetimeFigureOut">
               <a:rPr lang="en-GB" smtClean="0"/>
-              <a:t>02/03/2017</a:t>
+              <a:t>22/03/2017</a:t>
             </a:fld>
             <a:endParaRPr lang="en-GB" dirty="0"/>
           </a:p>
@@ -1241,7 +1241,7 @@
           <a:p>
             <a:fld id="{1C54AB3B-3A03-4B9C-A77D-B0E6FF1BCA80}" type="datetimeFigureOut">
               <a:rPr lang="en-GB" smtClean="0"/>
-              <a:t>02/03/2017</a:t>
+              <a:t>22/03/2017</a:t>
             </a:fld>
             <a:endParaRPr lang="en-GB" dirty="0"/>
           </a:p>
@@ -1608,7 +1608,7 @@
           <a:p>
             <a:fld id="{1C54AB3B-3A03-4B9C-A77D-B0E6FF1BCA80}" type="datetimeFigureOut">
               <a:rPr lang="en-GB" smtClean="0"/>
-              <a:t>02/03/2017</a:t>
+              <a:t>22/03/2017</a:t>
             </a:fld>
             <a:endParaRPr lang="en-GB" dirty="0"/>
           </a:p>
@@ -1726,7 +1726,7 @@
           <a:p>
             <a:fld id="{1C54AB3B-3A03-4B9C-A77D-B0E6FF1BCA80}" type="datetimeFigureOut">
               <a:rPr lang="en-GB" smtClean="0"/>
-              <a:t>02/03/2017</a:t>
+              <a:t>22/03/2017</a:t>
             </a:fld>
             <a:endParaRPr lang="en-GB" dirty="0"/>
           </a:p>
@@ -1821,7 +1821,7 @@
           <a:p>
             <a:fld id="{1C54AB3B-3A03-4B9C-A77D-B0E6FF1BCA80}" type="datetimeFigureOut">
               <a:rPr lang="en-GB" smtClean="0"/>
-              <a:t>02/03/2017</a:t>
+              <a:t>22/03/2017</a:t>
             </a:fld>
             <a:endParaRPr lang="en-GB" dirty="0"/>
           </a:p>
@@ -2098,7 +2098,7 @@
           <a:p>
             <a:fld id="{1C54AB3B-3A03-4B9C-A77D-B0E6FF1BCA80}" type="datetimeFigureOut">
               <a:rPr lang="en-GB" smtClean="0"/>
-              <a:t>02/03/2017</a:t>
+              <a:t>22/03/2017</a:t>
             </a:fld>
             <a:endParaRPr lang="en-GB" dirty="0"/>
           </a:p>
@@ -2351,7 +2351,7 @@
           <a:p>
             <a:fld id="{1C54AB3B-3A03-4B9C-A77D-B0E6FF1BCA80}" type="datetimeFigureOut">
               <a:rPr lang="en-GB" smtClean="0"/>
-              <a:t>02/03/2017</a:t>
+              <a:t>22/03/2017</a:t>
             </a:fld>
             <a:endParaRPr lang="en-GB" dirty="0"/>
           </a:p>
@@ -2564,7 +2564,7 @@
           <a:p>
             <a:fld id="{1C54AB3B-3A03-4B9C-A77D-B0E6FF1BCA80}" type="datetimeFigureOut">
               <a:rPr lang="en-GB" smtClean="0"/>
-              <a:t>02/03/2017</a:t>
+              <a:t>22/03/2017</a:t>
             </a:fld>
             <a:endParaRPr lang="en-GB" dirty="0"/>
           </a:p>
@@ -3016,42 +3016,6 @@
             </a:p>
           </p:txBody>
         </p:sp>
-        <p:cxnSp>
-          <p:nvCxnSpPr>
-            <p:cNvPr id="24" name="Straight Arrow Connector 23"/>
-            <p:cNvCxnSpPr/>
-            <p:nvPr/>
-          </p:nvCxnSpPr>
-          <p:spPr>
-            <a:xfrm>
-              <a:off x="3133229" y="1083785"/>
-              <a:ext cx="690921" cy="0"/>
-            </a:xfrm>
-            <a:prstGeom prst="straightConnector1">
-              <a:avLst/>
-            </a:prstGeom>
-            <a:ln>
-              <a:solidFill>
-                <a:schemeClr val="tx1"/>
-              </a:solidFill>
-              <a:tailEnd type="triangle"/>
-            </a:ln>
-          </p:spPr>
-          <p:style>
-            <a:lnRef idx="1">
-              <a:schemeClr val="accent1"/>
-            </a:lnRef>
-            <a:fillRef idx="0">
-              <a:schemeClr val="accent1"/>
-            </a:fillRef>
-            <a:effectRef idx="0">
-              <a:schemeClr val="accent1"/>
-            </a:effectRef>
-            <a:fontRef idx="minor">
-              <a:schemeClr val="tx1"/>
-            </a:fontRef>
-          </p:style>
-        </p:cxnSp>
         <p:sp>
           <p:nvSpPr>
             <p:cNvPr id="39" name="TextBox 38"/>
@@ -3447,6 +3411,46 @@
           </p:txBody>
         </p:sp>
       </p:grpSp>
+      <p:cxnSp>
+        <p:nvCxnSpPr>
+          <p:cNvPr id="16" name="Straight Arrow Connector 15"/>
+          <p:cNvCxnSpPr>
+            <a:cxnSpLocks/>
+            <a:stCxn id="61" idx="6"/>
+            <a:endCxn id="64" idx="2"/>
+          </p:cNvCxnSpPr>
+          <p:nvPr/>
+        </p:nvCxnSpPr>
+        <p:spPr>
+          <a:xfrm>
+            <a:off x="3225129" y="1119589"/>
+            <a:ext cx="561765" cy="0"/>
+          </a:xfrm>
+          <a:prstGeom prst="straightConnector1">
+            <a:avLst/>
+          </a:prstGeom>
+          <a:ln>
+            <a:solidFill>
+              <a:schemeClr val="tx1"/>
+            </a:solidFill>
+            <a:tailEnd type="triangle"/>
+          </a:ln>
+        </p:spPr>
+        <p:style>
+          <a:lnRef idx="1">
+            <a:schemeClr val="accent1"/>
+          </a:lnRef>
+          <a:fillRef idx="0">
+            <a:schemeClr val="accent1"/>
+          </a:fillRef>
+          <a:effectRef idx="0">
+            <a:schemeClr val="accent1"/>
+          </a:effectRef>
+          <a:fontRef idx="minor">
+            <a:schemeClr val="tx1"/>
+          </a:fontRef>
+        </p:style>
+      </p:cxnSp>
     </p:spTree>
     <p:extLst>
       <p:ext uri="{BB962C8B-B14F-4D97-AF65-F5344CB8AC3E}">

</xml_diff>

<commit_message>
Add experimental setup and fix diagrams
</commit_message>
<xml_diff>
--- a/proposal/proposal-project-structure-diagram.pptx
+++ b/proposal/proposal-project-structure-diagram.pptx
@@ -247,7 +247,7 @@
           <a:p>
             <a:fld id="{1C54AB3B-3A03-4B9C-A77D-B0E6FF1BCA80}" type="datetimeFigureOut">
               <a:rPr lang="en-GB" smtClean="0"/>
-              <a:t>08/05/2017</a:t>
+              <a:t>11/05/2017</a:t>
             </a:fld>
             <a:endParaRPr lang="en-GB" dirty="0"/>
           </a:p>
@@ -417,7 +417,7 @@
           <a:p>
             <a:fld id="{1C54AB3B-3A03-4B9C-A77D-B0E6FF1BCA80}" type="datetimeFigureOut">
               <a:rPr lang="en-GB" smtClean="0"/>
-              <a:t>08/05/2017</a:t>
+              <a:t>11/05/2017</a:t>
             </a:fld>
             <a:endParaRPr lang="en-GB" dirty="0"/>
           </a:p>
@@ -597,7 +597,7 @@
           <a:p>
             <a:fld id="{1C54AB3B-3A03-4B9C-A77D-B0E6FF1BCA80}" type="datetimeFigureOut">
               <a:rPr lang="en-GB" smtClean="0"/>
-              <a:t>08/05/2017</a:t>
+              <a:t>11/05/2017</a:t>
             </a:fld>
             <a:endParaRPr lang="en-GB" dirty="0"/>
           </a:p>
@@ -767,7 +767,7 @@
           <a:p>
             <a:fld id="{1C54AB3B-3A03-4B9C-A77D-B0E6FF1BCA80}" type="datetimeFigureOut">
               <a:rPr lang="en-GB" smtClean="0"/>
-              <a:t>08/05/2017</a:t>
+              <a:t>11/05/2017</a:t>
             </a:fld>
             <a:endParaRPr lang="en-GB" dirty="0"/>
           </a:p>
@@ -1013,7 +1013,7 @@
           <a:p>
             <a:fld id="{1C54AB3B-3A03-4B9C-A77D-B0E6FF1BCA80}" type="datetimeFigureOut">
               <a:rPr lang="en-GB" smtClean="0"/>
-              <a:t>08/05/2017</a:t>
+              <a:t>11/05/2017</a:t>
             </a:fld>
             <a:endParaRPr lang="en-GB" dirty="0"/>
           </a:p>
@@ -1245,7 +1245,7 @@
           <a:p>
             <a:fld id="{1C54AB3B-3A03-4B9C-A77D-B0E6FF1BCA80}" type="datetimeFigureOut">
               <a:rPr lang="en-GB" smtClean="0"/>
-              <a:t>08/05/2017</a:t>
+              <a:t>11/05/2017</a:t>
             </a:fld>
             <a:endParaRPr lang="en-GB" dirty="0"/>
           </a:p>
@@ -1612,7 +1612,7 @@
           <a:p>
             <a:fld id="{1C54AB3B-3A03-4B9C-A77D-B0E6FF1BCA80}" type="datetimeFigureOut">
               <a:rPr lang="en-GB" smtClean="0"/>
-              <a:t>08/05/2017</a:t>
+              <a:t>11/05/2017</a:t>
             </a:fld>
             <a:endParaRPr lang="en-GB" dirty="0"/>
           </a:p>
@@ -1730,7 +1730,7 @@
           <a:p>
             <a:fld id="{1C54AB3B-3A03-4B9C-A77D-B0E6FF1BCA80}" type="datetimeFigureOut">
               <a:rPr lang="en-GB" smtClean="0"/>
-              <a:t>08/05/2017</a:t>
+              <a:t>11/05/2017</a:t>
             </a:fld>
             <a:endParaRPr lang="en-GB" dirty="0"/>
           </a:p>
@@ -1825,7 +1825,7 @@
           <a:p>
             <a:fld id="{1C54AB3B-3A03-4B9C-A77D-B0E6FF1BCA80}" type="datetimeFigureOut">
               <a:rPr lang="en-GB" smtClean="0"/>
-              <a:t>08/05/2017</a:t>
+              <a:t>11/05/2017</a:t>
             </a:fld>
             <a:endParaRPr lang="en-GB" dirty="0"/>
           </a:p>
@@ -2102,7 +2102,7 @@
           <a:p>
             <a:fld id="{1C54AB3B-3A03-4B9C-A77D-B0E6FF1BCA80}" type="datetimeFigureOut">
               <a:rPr lang="en-GB" smtClean="0"/>
-              <a:t>08/05/2017</a:t>
+              <a:t>11/05/2017</a:t>
             </a:fld>
             <a:endParaRPr lang="en-GB" dirty="0"/>
           </a:p>
@@ -2355,7 +2355,7 @@
           <a:p>
             <a:fld id="{1C54AB3B-3A03-4B9C-A77D-B0E6FF1BCA80}" type="datetimeFigureOut">
               <a:rPr lang="en-GB" smtClean="0"/>
-              <a:t>08/05/2017</a:t>
+              <a:t>11/05/2017</a:t>
             </a:fld>
             <a:endParaRPr lang="en-GB" dirty="0"/>
           </a:p>
@@ -2568,7 +2568,7 @@
           <a:p>
             <a:fld id="{1C54AB3B-3A03-4B9C-A77D-B0E6FF1BCA80}" type="datetimeFigureOut">
               <a:rPr lang="en-GB" smtClean="0"/>
-              <a:t>08/05/2017</a:t>
+              <a:t>11/05/2017</a:t>
             </a:fld>
             <a:endParaRPr lang="en-GB" dirty="0"/>
           </a:p>
@@ -3011,7 +3011,7 @@
             <a:p>
               <a:pPr algn="ctr"/>
               <a:r>
-                <a:rPr lang="en-GB" sz="1100" b="1" dirty="0">
+                <a:rPr lang="en-GB" sz="1100" dirty="0">
                   <a:latin typeface="cmr12" panose="020B0500000000000000" pitchFamily="34" charset="0"/>
                   <a:cs typeface="Times New Roman" panose="02020603050405020304" pitchFamily="18" charset="0"/>
                 </a:rPr>
@@ -3044,7 +3044,7 @@
             <a:p>
               <a:pPr algn="ctr"/>
               <a:r>
-                <a:rPr lang="en-GB" sz="1100" b="1" dirty="0">
+                <a:rPr lang="en-GB" sz="1100" dirty="0">
                   <a:latin typeface="cmr12" panose="020B0500000000000000" pitchFamily="34" charset="0"/>
                   <a:cs typeface="Times New Roman" panose="02020603050405020304" pitchFamily="18" charset="0"/>
                 </a:rPr>
@@ -3077,7 +3077,7 @@
             <a:p>
               <a:pPr algn="ctr"/>
               <a:r>
-                <a:rPr lang="en-GB" sz="1100" b="1" dirty="0">
+                <a:rPr lang="en-GB" sz="1100" dirty="0">
                   <a:latin typeface="cmr12" panose="020B0500000000000000" pitchFamily="34" charset="0"/>
                   <a:cs typeface="Times New Roman" panose="02020603050405020304" pitchFamily="18" charset="0"/>
                 </a:rPr>
@@ -3408,7 +3408,7 @@
             <a:p>
               <a:pPr algn="ctr"/>
               <a:r>
-                <a:rPr lang="en-GB" sz="1100" b="1" dirty="0">
+                <a:rPr lang="en-GB" sz="1100" dirty="0">
                   <a:latin typeface="cmr12" panose="020B0500000000000000" pitchFamily="34" charset="0"/>
                   <a:cs typeface="Times New Roman" panose="02020603050405020304" pitchFamily="18" charset="0"/>
                 </a:rPr>

</xml_diff>